<commit_message>
Update dev guide diagrams + code marking for docs files + update ui mockup
</commit_message>
<xml_diff>
--- a/docs/diagrams/Diagrams.pptx
+++ b/docs/diagrams/Diagrams.pptx
@@ -200,7 +200,7 @@
           <a:p>
             <a:fld id="{F5CC4B3F-88C1-4FFA-B1B6-F41C21DC6924}" type="datetimeFigureOut">
               <a:rPr lang="en-US" smtClean="0"/>
-              <a:t>9/30/2016</a:t>
+              <a:t>26/10/16</a:t>
             </a:fld>
             <a:endParaRPr lang="en-US"/>
           </a:p>
@@ -649,7 +649,7 @@
           <a:p>
             <a:fld id="{78C97017-6FC3-485B-9764-EAC9E56C1D49}" type="datetimeFigureOut">
               <a:rPr lang="en-US" smtClean="0"/>
-              <a:t>9/30/2016</a:t>
+              <a:t>26/10/16</a:t>
             </a:fld>
             <a:endParaRPr lang="en-US"/>
           </a:p>
@@ -819,7 +819,7 @@
           <a:p>
             <a:fld id="{78C97017-6FC3-485B-9764-EAC9E56C1D49}" type="datetimeFigureOut">
               <a:rPr lang="en-US" smtClean="0"/>
-              <a:t>9/30/2016</a:t>
+              <a:t>26/10/16</a:t>
             </a:fld>
             <a:endParaRPr lang="en-US"/>
           </a:p>
@@ -999,7 +999,7 @@
           <a:p>
             <a:fld id="{78C97017-6FC3-485B-9764-EAC9E56C1D49}" type="datetimeFigureOut">
               <a:rPr lang="en-US" smtClean="0"/>
-              <a:t>9/30/2016</a:t>
+              <a:t>26/10/16</a:t>
             </a:fld>
             <a:endParaRPr lang="en-US"/>
           </a:p>
@@ -1169,7 +1169,7 @@
           <a:p>
             <a:fld id="{78C97017-6FC3-485B-9764-EAC9E56C1D49}" type="datetimeFigureOut">
               <a:rPr lang="en-US" smtClean="0"/>
-              <a:t>9/30/2016</a:t>
+              <a:t>26/10/16</a:t>
             </a:fld>
             <a:endParaRPr lang="en-US"/>
           </a:p>
@@ -1415,7 +1415,7 @@
           <a:p>
             <a:fld id="{78C97017-6FC3-485B-9764-EAC9E56C1D49}" type="datetimeFigureOut">
               <a:rPr lang="en-US" smtClean="0"/>
-              <a:t>9/30/2016</a:t>
+              <a:t>26/10/16</a:t>
             </a:fld>
             <a:endParaRPr lang="en-US"/>
           </a:p>
@@ -1703,7 +1703,7 @@
           <a:p>
             <a:fld id="{78C97017-6FC3-485B-9764-EAC9E56C1D49}" type="datetimeFigureOut">
               <a:rPr lang="en-US" smtClean="0"/>
-              <a:t>9/30/2016</a:t>
+              <a:t>26/10/16</a:t>
             </a:fld>
             <a:endParaRPr lang="en-US"/>
           </a:p>
@@ -2125,7 +2125,7 @@
           <a:p>
             <a:fld id="{78C97017-6FC3-485B-9764-EAC9E56C1D49}" type="datetimeFigureOut">
               <a:rPr lang="en-US" smtClean="0"/>
-              <a:t>9/30/2016</a:t>
+              <a:t>26/10/16</a:t>
             </a:fld>
             <a:endParaRPr lang="en-US"/>
           </a:p>
@@ -2243,7 +2243,7 @@
           <a:p>
             <a:fld id="{78C97017-6FC3-485B-9764-EAC9E56C1D49}" type="datetimeFigureOut">
               <a:rPr lang="en-US" smtClean="0"/>
-              <a:t>9/30/2016</a:t>
+              <a:t>26/10/16</a:t>
             </a:fld>
             <a:endParaRPr lang="en-US"/>
           </a:p>
@@ -2338,7 +2338,7 @@
           <a:p>
             <a:fld id="{78C97017-6FC3-485B-9764-EAC9E56C1D49}" type="datetimeFigureOut">
               <a:rPr lang="en-US" smtClean="0"/>
-              <a:t>9/30/2016</a:t>
+              <a:t>26/10/16</a:t>
             </a:fld>
             <a:endParaRPr lang="en-US"/>
           </a:p>
@@ -2615,7 +2615,7 @@
           <a:p>
             <a:fld id="{78C97017-6FC3-485B-9764-EAC9E56C1D49}" type="datetimeFigureOut">
               <a:rPr lang="en-US" smtClean="0"/>
-              <a:t>9/30/2016</a:t>
+              <a:t>26/10/16</a:t>
             </a:fld>
             <a:endParaRPr lang="en-US"/>
           </a:p>
@@ -2868,7 +2868,7 @@
           <a:p>
             <a:fld id="{78C97017-6FC3-485B-9764-EAC9E56C1D49}" type="datetimeFigureOut">
               <a:rPr lang="en-US" smtClean="0"/>
-              <a:t>9/30/2016</a:t>
+              <a:t>26/10/16</a:t>
             </a:fld>
             <a:endParaRPr lang="en-US"/>
           </a:p>
@@ -3081,7 +3081,7 @@
           <a:p>
             <a:fld id="{78C97017-6FC3-485B-9764-EAC9E56C1D49}" type="datetimeFigureOut">
               <a:rPr lang="en-US" smtClean="0"/>
-              <a:t>9/30/2016</a:t>
+              <a:t>26/10/16</a:t>
             </a:fld>
             <a:endParaRPr lang="en-US"/>
           </a:p>
@@ -3473,11 +3473,15 @@
           <a:p>
             <a:r>
               <a:rPr lang="en-US" dirty="0" err="1" smtClean="0"/>
-              <a:t>AddressBook</a:t>
+              <a:t>SuperbTodo</a:t>
             </a:r>
             <a:r>
               <a:rPr lang="en-US" dirty="0" smtClean="0"/>
-              <a:t> – Level 4</a:t>
+              <a:t> </a:t>
+            </a:r>
+            <a:r>
+              <a:rPr lang="en-US" dirty="0" smtClean="0"/>
+              <a:t>– Level 4</a:t>
             </a:r>
             <a:endParaRPr lang="en-US" dirty="0"/>
           </a:p>
@@ -4262,101 +4266,6 @@
           </a:p>
         </p:txBody>
       </p:sp>
-      <p:sp>
-        <p:nvSpPr>
-          <p:cNvPr id="51" name="Cloud 50"/>
-          <p:cNvSpPr/>
-          <p:nvPr/>
-        </p:nvSpPr>
-        <p:spPr>
-          <a:xfrm>
-            <a:off x="2650069" y="1447800"/>
-            <a:ext cx="914400" cy="533400"/>
-          </a:xfrm>
-          <a:prstGeom prst="cloud">
-            <a:avLst/>
-          </a:prstGeom>
-          <a:solidFill>
-            <a:schemeClr val="bg1"/>
-          </a:solidFill>
-          <a:ln>
-            <a:solidFill>
-              <a:schemeClr val="tx1"/>
-            </a:solidFill>
-          </a:ln>
-        </p:spPr>
-        <p:style>
-          <a:lnRef idx="2">
-            <a:schemeClr val="accent1">
-              <a:shade val="50000"/>
-            </a:schemeClr>
-          </a:lnRef>
-          <a:fillRef idx="1">
-            <a:schemeClr val="accent1"/>
-          </a:fillRef>
-          <a:effectRef idx="0">
-            <a:schemeClr val="accent1"/>
-          </a:effectRef>
-          <a:fontRef idx="minor">
-            <a:schemeClr val="lt1"/>
-          </a:fontRef>
-        </p:style>
-        <p:txBody>
-          <a:bodyPr rtlCol="0" anchor="ctr"/>
-          <a:lstStyle/>
-          <a:p>
-            <a:pPr algn="ctr"/>
-            <a:r>
-              <a:rPr lang="en-US" sz="1400" dirty="0">
-                <a:solidFill>
-                  <a:schemeClr val="tx1"/>
-                </a:solidFill>
-              </a:rPr>
-              <a:t>Web</a:t>
-            </a:r>
-          </a:p>
-        </p:txBody>
-      </p:sp>
-      <p:cxnSp>
-        <p:nvCxnSpPr>
-          <p:cNvPr id="52" name="Elbow Connector 51"/>
-          <p:cNvCxnSpPr>
-            <a:stCxn id="2" idx="0"/>
-            <a:endCxn id="51" idx="2"/>
-          </p:cNvCxnSpPr>
-          <p:nvPr/>
-        </p:nvCxnSpPr>
-        <p:spPr>
-          <a:xfrm rot="5400000" flipH="1" flipV="1">
-            <a:off x="2222648" y="1760922"/>
-            <a:ext cx="476678" cy="383835"/>
-          </a:xfrm>
-          <a:prstGeom prst="bentConnector2">
-            <a:avLst/>
-          </a:prstGeom>
-          <a:ln w="28575">
-            <a:solidFill>
-              <a:srgbClr val="00B050"/>
-            </a:solidFill>
-            <a:prstDash val="sysDot"/>
-            <a:tailEnd type="arrow"/>
-          </a:ln>
-        </p:spPr>
-        <p:style>
-          <a:lnRef idx="1">
-            <a:schemeClr val="accent1"/>
-          </a:lnRef>
-          <a:fillRef idx="0">
-            <a:schemeClr val="accent1"/>
-          </a:fillRef>
-          <a:effectRef idx="0">
-            <a:schemeClr val="accent1"/>
-          </a:effectRef>
-          <a:fontRef idx="minor">
-            <a:schemeClr val="tx1"/>
-          </a:fontRef>
-        </p:style>
-      </p:cxnSp>
       <p:sp>
         <p:nvSpPr>
           <p:cNvPr id="23" name="Rectangle 62"/>
@@ -5748,20 +5657,20 @@
           <a:lstStyle/>
           <a:p>
             <a:r>
-              <a:rPr lang="en-US" sz="1400" dirty="0" err="1" smtClean="0">
-                <a:solidFill>
-                  <a:srgbClr val="7030A0"/>
-                </a:solidFill>
-              </a:rPr>
-              <a:t>deletePerson</a:t>
-            </a:r>
-            <a:r>
               <a:rPr lang="en-US" sz="1400" dirty="0" smtClean="0">
                 <a:solidFill>
                   <a:srgbClr val="7030A0"/>
                 </a:solidFill>
               </a:rPr>
-              <a:t>(p)</a:t>
+              <a:t>deleteTask(</a:t>
+            </a:r>
+            <a:r>
+              <a:rPr lang="en-US" sz="1400" dirty="0" smtClean="0">
+                <a:solidFill>
+                  <a:srgbClr val="7030A0"/>
+                </a:solidFill>
+              </a:rPr>
+              <a:t>p)</a:t>
             </a:r>
             <a:endParaRPr lang="en-US" sz="1400" dirty="0">
               <a:solidFill>
@@ -5801,17 +5710,27 @@
                   </a:schemeClr>
                 </a:solidFill>
               </a:rPr>
-              <a:t>post(</a:t>
-            </a:r>
-            <a:r>
-              <a:rPr lang="en-US" sz="1400" dirty="0" err="1" smtClean="0">
+              <a:t>Post(</a:t>
+            </a:r>
+            <a:r>
+              <a:rPr lang="en-US" sz="1400" dirty="0" smtClean="0">
                 <a:solidFill>
                   <a:schemeClr val="accent5">
                     <a:lumMod val="75000"/>
                   </a:schemeClr>
                 </a:solidFill>
               </a:rPr>
-              <a:t>AddressBookChangedEvent</a:t>
+              <a:t>SuperbTodo</a:t>
+            </a:r>
+            <a:r>
+              <a:rPr lang="en-US" sz="1400" dirty="0" smtClean="0">
+                <a:solidFill>
+                  <a:schemeClr val="accent5">
+                    <a:lumMod val="75000"/>
+                  </a:schemeClr>
+                </a:solidFill>
+              </a:rPr>
+              <a:t>ChangedEvent</a:t>
             </a:r>
             <a:r>
               <a:rPr lang="en-US" sz="1400" dirty="0" smtClean="0">
@@ -6000,15 +5919,7 @@
                   <a:schemeClr val="bg1"/>
                 </a:solidFill>
               </a:rPr>
-              <a:t>:</a:t>
-            </a:r>
-            <a:r>
-              <a:rPr lang="en-US" sz="1600" dirty="0" err="1" smtClean="0">
-                <a:solidFill>
-                  <a:schemeClr val="bg1"/>
-                </a:solidFill>
-              </a:rPr>
-              <a:t>EventsCenter</a:t>
+              <a:t>:EventsCenter</a:t>
             </a:r>
             <a:endParaRPr lang="en-SG" sz="1600" dirty="0">
               <a:solidFill>
@@ -6375,17 +6286,27 @@
                   </a:schemeClr>
                 </a:solidFill>
               </a:rPr>
-              <a:t>post(</a:t>
-            </a:r>
-            <a:r>
-              <a:rPr lang="en-US" sz="1400" dirty="0" err="1" smtClean="0">
+              <a:t>Post(</a:t>
+            </a:r>
+            <a:r>
+              <a:rPr lang="en-US" sz="1400" dirty="0" smtClean="0">
                 <a:solidFill>
                   <a:schemeClr val="accent5">
                     <a:lumMod val="75000"/>
                   </a:schemeClr>
                 </a:solidFill>
               </a:rPr>
-              <a:t>AddressBookChangedEvent</a:t>
+              <a:t>SuperbTodo</a:t>
+            </a:r>
+            <a:r>
+              <a:rPr lang="en-US" sz="1400" dirty="0" smtClean="0">
+                <a:solidFill>
+                  <a:schemeClr val="accent5">
+                    <a:lumMod val="75000"/>
+                  </a:schemeClr>
+                </a:solidFill>
+              </a:rPr>
+              <a:t>ChangedEvent</a:t>
             </a:r>
             <a:r>
               <a:rPr lang="en-US" sz="1400" dirty="0" smtClean="0">
@@ -6500,15 +6421,7 @@
                   <a:schemeClr val="bg1"/>
                 </a:solidFill>
               </a:rPr>
-              <a:t>:</a:t>
-            </a:r>
-            <a:r>
-              <a:rPr lang="en-US" sz="1600" dirty="0" err="1" smtClean="0">
-                <a:solidFill>
-                  <a:schemeClr val="bg1"/>
-                </a:solidFill>
-              </a:rPr>
-              <a:t>EventsCenter</a:t>
+              <a:t>:EventsCenter</a:t>
             </a:r>
             <a:endParaRPr lang="en-SG" sz="1600" dirty="0">
               <a:solidFill>
@@ -6750,14 +6663,14 @@
           <a:lstStyle/>
           <a:p>
             <a:r>
-              <a:rPr lang="en-US" sz="1400" dirty="0" err="1" smtClean="0">
+              <a:rPr lang="en-US" sz="1400" dirty="0" smtClean="0">
                 <a:solidFill>
                   <a:schemeClr val="accent6">
                     <a:lumMod val="75000"/>
                   </a:schemeClr>
                 </a:solidFill>
               </a:rPr>
-              <a:t>handleAddresssBookChangedEvent</a:t>
+              <a:t>handleSuperbTodoChangedEvent</a:t>
             </a:r>
             <a:r>
               <a:rPr lang="en-US" sz="1400" dirty="0" smtClean="0">
@@ -7063,12 +6976,12 @@
           <a:lstStyle/>
           <a:p>
             <a:r>
-              <a:rPr lang="en-US" sz="1400" dirty="0" err="1" smtClean="0">
+              <a:rPr lang="en-US" sz="1400" dirty="0" smtClean="0">
                 <a:solidFill>
                   <a:srgbClr val="00B050"/>
                 </a:solidFill>
               </a:rPr>
-              <a:t>handleAddresssBookChangedEvent</a:t>
+              <a:t>handleSuperbTodoChangedEvent</a:t>
             </a:r>
             <a:r>
               <a:rPr lang="en-US" sz="1400" dirty="0" smtClean="0">
@@ -7518,6 +7431,13 @@
   <p:clrMapOvr>
     <a:masterClrMapping/>
   </p:clrMapOvr>
+  <p:timing>
+    <p:tnLst>
+      <p:par>
+        <p:cTn xmlns:p14="http://schemas.microsoft.com/office/powerpoint/2010/main" id="1" dur="indefinite" restart="never" nodeType="tmRoot"/>
+      </p:par>
+    </p:tnLst>
+  </p:timing>
 </p:sld>
 </file>
 
@@ -7975,66 +7895,6 @@
       </p:sp>
       <p:sp>
         <p:nvSpPr>
-          <p:cNvPr id="34" name="Rectangle 11"/>
-          <p:cNvSpPr/>
-          <p:nvPr/>
-        </p:nvSpPr>
-        <p:spPr>
-          <a:xfrm>
-            <a:off x="2592528" y="3649359"/>
-            <a:ext cx="1093635" cy="236841"/>
-          </a:xfrm>
-          <a:prstGeom prst="rect">
-            <a:avLst/>
-          </a:prstGeom>
-          <a:ln w="19050">
-            <a:solidFill>
-              <a:schemeClr val="accent3"/>
-            </a:solidFill>
-          </a:ln>
-          <a:effectLst/>
-        </p:spPr>
-        <p:style>
-          <a:lnRef idx="1">
-            <a:schemeClr val="accent3"/>
-          </a:lnRef>
-          <a:fillRef idx="2">
-            <a:schemeClr val="accent3"/>
-          </a:fillRef>
-          <a:effectRef idx="1">
-            <a:schemeClr val="accent3"/>
-          </a:effectRef>
-          <a:fontRef idx="minor">
-            <a:schemeClr val="dk1"/>
-          </a:fontRef>
-        </p:style>
-        <p:txBody>
-          <a:bodyPr rtlCol="0" anchor="ctr"/>
-          <a:lstStyle/>
-          <a:p>
-            <a:pPr algn="ctr"/>
-            <a:r>
-              <a:rPr lang="en-US" sz="1050" b="1" dirty="0" err="1">
-                <a:solidFill>
-                  <a:schemeClr val="accent3">
-                    <a:lumMod val="75000"/>
-                  </a:schemeClr>
-                </a:solidFill>
-              </a:rPr>
-              <a:t>BrowserPanel</a:t>
-            </a:r>
-            <a:endParaRPr lang="en-SG" sz="1050" b="1" dirty="0">
-              <a:solidFill>
-                <a:schemeClr val="accent3">
-                  <a:lumMod val="75000"/>
-                </a:schemeClr>
-              </a:solidFill>
-            </a:endParaRPr>
-          </a:p>
-        </p:txBody>
-      </p:sp>
-      <p:sp>
-        <p:nvSpPr>
           <p:cNvPr id="35" name="Rectangle 11"/>
           <p:cNvSpPr/>
           <p:nvPr/>
@@ -8134,14 +7994,24 @@
           <a:p>
             <a:pPr algn="ctr"/>
             <a:r>
-              <a:rPr lang="en-US" sz="1050" b="1" dirty="0" err="1">
+              <a:rPr lang="en-US" sz="1050" b="1" dirty="0" err="1" smtClean="0">
                 <a:solidFill>
                   <a:schemeClr val="accent3">
                     <a:lumMod val="75000"/>
                   </a:schemeClr>
                 </a:solidFill>
               </a:rPr>
-              <a:t>PersonListPanel</a:t>
+              <a:t>Task</a:t>
+            </a:r>
+            <a:r>
+              <a:rPr lang="en-US" sz="1050" b="1" dirty="0" err="1" smtClean="0">
+                <a:solidFill>
+                  <a:schemeClr val="accent3">
+                    <a:lumMod val="75000"/>
+                  </a:schemeClr>
+                </a:solidFill>
+              </a:rPr>
+              <a:t>ListPanel</a:t>
             </a:r>
             <a:endParaRPr lang="en-SG" sz="1050" b="1" dirty="0">
               <a:solidFill>
@@ -8194,14 +8064,24 @@
           <a:p>
             <a:pPr algn="ctr"/>
             <a:r>
-              <a:rPr lang="en-US" sz="1050" b="1" dirty="0" err="1">
+              <a:rPr lang="en-US" sz="1050" b="1" dirty="0" err="1" smtClean="0">
                 <a:solidFill>
                   <a:schemeClr val="accent3">
                     <a:lumMod val="75000"/>
                   </a:schemeClr>
                 </a:solidFill>
               </a:rPr>
-              <a:t>PersonCard</a:t>
+              <a:t>Task</a:t>
+            </a:r>
+            <a:r>
+              <a:rPr lang="en-US" sz="1050" b="1" dirty="0" err="1" smtClean="0">
+                <a:solidFill>
+                  <a:schemeClr val="accent3">
+                    <a:lumMod val="75000"/>
+                  </a:schemeClr>
+                </a:solidFill>
+              </a:rPr>
+              <a:t>Card</a:t>
             </a:r>
             <a:endParaRPr lang="en-SG" sz="1050" b="1" dirty="0">
               <a:solidFill>
@@ -8422,47 +8302,6 @@
           </a:p>
         </p:txBody>
       </p:sp>
-      <p:cxnSp>
-        <p:nvCxnSpPr>
-          <p:cNvPr id="44" name="Elbow Connector 63"/>
-          <p:cNvCxnSpPr>
-            <a:stCxn id="39" idx="2"/>
-            <a:endCxn id="34" idx="1"/>
-          </p:cNvCxnSpPr>
-          <p:nvPr/>
-        </p:nvCxnSpPr>
-        <p:spPr>
-          <a:xfrm rot="16200000" flipH="1">
-            <a:off x="2054450" y="3229701"/>
-            <a:ext cx="899755" cy="176402"/>
-          </a:xfrm>
-          <a:prstGeom prst="bentConnector2">
-            <a:avLst/>
-          </a:prstGeom>
-          <a:ln w="19050">
-            <a:solidFill>
-              <a:schemeClr val="accent3"/>
-            </a:solidFill>
-            <a:headEnd type="none" w="med" len="med"/>
-            <a:tailEnd type="arrow" w="med" len="med"/>
-          </a:ln>
-          <a:effectLst/>
-        </p:spPr>
-        <p:style>
-          <a:lnRef idx="1">
-            <a:schemeClr val="accent2"/>
-          </a:lnRef>
-          <a:fillRef idx="2">
-            <a:schemeClr val="accent2"/>
-          </a:fillRef>
-          <a:effectRef idx="1">
-            <a:schemeClr val="accent2"/>
-          </a:effectRef>
-          <a:fontRef idx="minor">
-            <a:schemeClr val="dk1"/>
-          </a:fontRef>
-        </p:style>
-      </p:cxnSp>
       <p:cxnSp>
         <p:nvCxnSpPr>
           <p:cNvPr id="47" name="Elbow Connector 63"/>
@@ -8718,47 +8557,6 @@
           <a:xfrm rot="5400000">
             <a:off x="4174488" y="2991741"/>
             <a:ext cx="2061222" cy="649740"/>
-          </a:xfrm>
-          <a:prstGeom prst="bentConnector2">
-            <a:avLst/>
-          </a:prstGeom>
-          <a:ln w="6350">
-            <a:solidFill>
-              <a:schemeClr val="accent3"/>
-            </a:solidFill>
-            <a:headEnd type="none" w="med" len="med"/>
-            <a:tailEnd type="none" w="med" len="med"/>
-          </a:ln>
-          <a:effectLst/>
-        </p:spPr>
-        <p:style>
-          <a:lnRef idx="1">
-            <a:schemeClr val="accent2"/>
-          </a:lnRef>
-          <a:fillRef idx="2">
-            <a:schemeClr val="accent2"/>
-          </a:fillRef>
-          <a:effectRef idx="1">
-            <a:schemeClr val="accent2"/>
-          </a:effectRef>
-          <a:fontRef idx="minor">
-            <a:schemeClr val="dk1"/>
-          </a:fontRef>
-        </p:style>
-      </p:cxnSp>
-      <p:cxnSp>
-        <p:nvCxnSpPr>
-          <p:cNvPr id="82" name="Elbow Connector 63"/>
-          <p:cNvCxnSpPr>
-            <a:stCxn id="16" idx="3"/>
-            <a:endCxn id="34" idx="3"/>
-          </p:cNvCxnSpPr>
-          <p:nvPr/>
-        </p:nvCxnSpPr>
-        <p:spPr>
-          <a:xfrm rot="5400000">
-            <a:off x="3867176" y="2104987"/>
-            <a:ext cx="1481780" cy="1843806"/>
           </a:xfrm>
           <a:prstGeom prst="bentConnector2">
             <a:avLst/>
@@ -9756,7 +9554,7 @@
   <p:timing>
     <p:tnLst>
       <p:par>
-        <p:cTn id="1" dur="indefinite" restart="never" nodeType="tmRoot"/>
+        <p:cTn xmlns:p14="http://schemas.microsoft.com/office/powerpoint/2010/main" id="1" dur="indefinite" restart="never" nodeType="tmRoot"/>
       </p:par>
     </p:tnLst>
   </p:timing>
@@ -11545,7 +11343,7 @@
   <p:timing>
     <p:tnLst>
       <p:par>
-        <p:cTn id="1" dur="indefinite" restart="never" nodeType="tmRoot"/>
+        <p:cTn xmlns:p14="http://schemas.microsoft.com/office/powerpoint/2010/main" id="1" dur="indefinite" restart="never" nodeType="tmRoot"/>
       </p:par>
     </p:tnLst>
   </p:timing>
@@ -12280,7 +12078,6 @@
               <a:rPr lang="en-US" dirty="0"/>
               <a:t>execute()</a:t>
             </a:r>
-            <a:endParaRPr lang="en-US" dirty="0"/>
           </a:p>
         </p:txBody>
       </p:sp>
@@ -12792,20 +12589,20 @@
           </a:lstStyle>
           <a:p>
             <a:r>
-              <a:rPr lang="en-US" dirty="0" err="1" smtClean="0">
-                <a:solidFill>
-                  <a:srgbClr val="7030A0"/>
-                </a:solidFill>
-              </a:rPr>
-              <a:t>deletePerson</a:t>
-            </a:r>
-            <a:r>
               <a:rPr lang="en-US" dirty="0" smtClean="0">
                 <a:solidFill>
                   <a:srgbClr val="7030A0"/>
                 </a:solidFill>
               </a:rPr>
-              <a:t>(p)</a:t>
+              <a:t>deleteTask(</a:t>
+            </a:r>
+            <a:r>
+              <a:rPr lang="en-US" dirty="0" smtClean="0">
+                <a:solidFill>
+                  <a:srgbClr val="7030A0"/>
+                </a:solidFill>
+              </a:rPr>
+              <a:t>p)</a:t>
             </a:r>
             <a:endParaRPr lang="en-US" dirty="0">
               <a:solidFill>
@@ -13225,6 +13022,13 @@
   <p:clrMapOvr>
     <a:masterClrMapping/>
   </p:clrMapOvr>
+  <p:timing>
+    <p:tnLst>
+      <p:par>
+        <p:cTn xmlns:p14="http://schemas.microsoft.com/office/powerpoint/2010/main" id="1" dur="indefinite" restart="never" nodeType="tmRoot"/>
+      </p:par>
+    </p:tnLst>
+  </p:timing>
 </p:sld>
 </file>
 
@@ -13936,7 +13740,7 @@
                   <a:srgbClr val="7030A0"/>
                 </a:solidFill>
               </a:rPr>
-              <a:t>AddressBook</a:t>
+              <a:t>SuperbTodo</a:t>
             </a:r>
             <a:endParaRPr lang="en-SG" sz="1050" dirty="0">
               <a:solidFill>
@@ -14078,7 +13882,7 @@
                   <a:srgbClr val="7030A0"/>
                 </a:solidFill>
               </a:rPr>
-              <a:t>UniquePersonList</a:t>
+              <a:t>UniqueTaskList</a:t>
             </a:r>
             <a:endParaRPr lang="en-SG" sz="1050" dirty="0">
               <a:solidFill>
@@ -14321,7 +14125,7 @@
                   <a:srgbClr val="7030A0"/>
                 </a:solidFill>
               </a:rPr>
-              <a:t>Person</a:t>
+              <a:t>Task</a:t>
             </a:r>
             <a:endParaRPr lang="en-SG" sz="1050" dirty="0">
               <a:solidFill>
@@ -14620,7 +14424,7 @@
                   <a:srgbClr val="7030A0"/>
                 </a:solidFill>
               </a:rPr>
-              <a:t>ReadOnlyPerson</a:t>
+              <a:t>ReadOnlyTask</a:t>
             </a:r>
             <a:endParaRPr lang="en-SG" sz="1050" dirty="0">
               <a:solidFill>
@@ -14638,8 +14442,8 @@
         </p:nvSpPr>
         <p:spPr>
           <a:xfrm>
-            <a:off x="7712397" y="2564238"/>
-            <a:ext cx="708186" cy="285783"/>
+            <a:off x="7543800" y="2564238"/>
+            <a:ext cx="990599" cy="285783"/>
           </a:xfrm>
           <a:prstGeom prst="rect">
             <a:avLst/>
@@ -14671,14 +14475,14 @@
           <a:p>
             <a:pPr algn="ctr"/>
             <a:r>
-              <a:rPr lang="en-US" sz="1050" dirty="0" smtClean="0">
+              <a:rPr lang="en-US" sz="1000" dirty="0" err="1" smtClean="0">
                 <a:solidFill>
                   <a:srgbClr val="7030A0"/>
                 </a:solidFill>
               </a:rPr>
-              <a:t>Name</a:t>
-            </a:r>
-            <a:endParaRPr lang="en-SG" sz="1050" dirty="0">
+              <a:t>TaskName</a:t>
+            </a:r>
+            <a:endParaRPr lang="en-SG" sz="1000" dirty="0">
               <a:solidFill>
                 <a:srgbClr val="7030A0"/>
               </a:solidFill>
@@ -14745,7 +14549,7 @@
         <p:spPr>
           <a:xfrm flipV="1">
             <a:off x="7277995" y="2707130"/>
-            <a:ext cx="434402" cy="327761"/>
+            <a:ext cx="265805" cy="327761"/>
           </a:xfrm>
           <a:prstGeom prst="bentConnector3">
             <a:avLst/>
@@ -14782,8 +14586,8 @@
         </p:nvSpPr>
         <p:spPr>
           <a:xfrm>
-            <a:off x="7712397" y="2887216"/>
-            <a:ext cx="708186" cy="285783"/>
+            <a:off x="7543800" y="2887216"/>
+            <a:ext cx="990599" cy="285783"/>
           </a:xfrm>
           <a:prstGeom prst="rect">
             <a:avLst/>
@@ -14815,14 +14619,14 @@
           <a:p>
             <a:pPr algn="ctr"/>
             <a:r>
-              <a:rPr lang="en-US" sz="1050" dirty="0" smtClean="0">
+              <a:rPr lang="en-US" sz="1000" dirty="0" err="1" smtClean="0">
                 <a:solidFill>
                   <a:srgbClr val="7030A0"/>
                 </a:solidFill>
               </a:rPr>
-              <a:t>Phone</a:t>
-            </a:r>
-            <a:endParaRPr lang="en-SG" sz="1050" dirty="0">
+              <a:t>DateTime</a:t>
+            </a:r>
+            <a:endParaRPr lang="en-SG" sz="1000" dirty="0">
               <a:solidFill>
                 <a:srgbClr val="7030A0"/>
               </a:solidFill>
@@ -14842,7 +14646,7 @@
         <p:spPr>
           <a:xfrm flipV="1">
             <a:off x="7277995" y="3030108"/>
-            <a:ext cx="434402" cy="4783"/>
+            <a:ext cx="265805" cy="4783"/>
           </a:xfrm>
           <a:prstGeom prst="bentConnector3">
             <a:avLst/>
@@ -14879,8 +14683,8 @@
         </p:nvSpPr>
         <p:spPr>
           <a:xfrm>
-            <a:off x="7712397" y="3210194"/>
-            <a:ext cx="708186" cy="285783"/>
+            <a:off x="7543800" y="3210194"/>
+            <a:ext cx="990599" cy="285783"/>
           </a:xfrm>
           <a:prstGeom prst="rect">
             <a:avLst/>
@@ -14912,14 +14716,14 @@
           <a:p>
             <a:pPr algn="ctr"/>
             <a:r>
-              <a:rPr lang="en-US" sz="1050" dirty="0" smtClean="0">
+              <a:rPr lang="en-US" sz="1000" dirty="0" err="1" smtClean="0">
                 <a:solidFill>
                   <a:srgbClr val="7030A0"/>
                 </a:solidFill>
               </a:rPr>
-              <a:t>Email</a:t>
-            </a:r>
-            <a:endParaRPr lang="en-SG" sz="1050" dirty="0">
+              <a:t>DueDateTime</a:t>
+            </a:r>
+            <a:endParaRPr lang="en-SG" sz="1000" dirty="0">
               <a:solidFill>
                 <a:srgbClr val="7030A0"/>
               </a:solidFill>
@@ -14939,7 +14743,7 @@
         <p:spPr>
           <a:xfrm>
             <a:off x="7277995" y="3034891"/>
-            <a:ext cx="434402" cy="318195"/>
+            <a:ext cx="265805" cy="318195"/>
           </a:xfrm>
           <a:prstGeom prst="bentConnector3">
             <a:avLst/>
@@ -14976,8 +14780,8 @@
         </p:nvSpPr>
         <p:spPr>
           <a:xfrm>
-            <a:off x="7712397" y="3533171"/>
-            <a:ext cx="708186" cy="285783"/>
+            <a:off x="7543800" y="3533171"/>
+            <a:ext cx="990599" cy="285783"/>
           </a:xfrm>
           <a:prstGeom prst="rect">
             <a:avLst/>
@@ -15009,14 +14813,14 @@
           <a:p>
             <a:pPr algn="ctr"/>
             <a:r>
-              <a:rPr lang="en-US" sz="1050" dirty="0" smtClean="0">
+              <a:rPr lang="en-US" sz="1000" dirty="0" err="1" smtClean="0">
                 <a:solidFill>
                   <a:srgbClr val="7030A0"/>
                 </a:solidFill>
               </a:rPr>
-              <a:t>Address</a:t>
-            </a:r>
-            <a:endParaRPr lang="en-SG" sz="1050" dirty="0">
+              <a:t>UniqueTaskList</a:t>
+            </a:r>
+            <a:endParaRPr lang="en-SG" sz="1000" dirty="0">
               <a:solidFill>
                 <a:srgbClr val="7030A0"/>
               </a:solidFill>
@@ -15036,7 +14840,7 @@
         <p:spPr>
           <a:xfrm>
             <a:off x="7277995" y="3034891"/>
-            <a:ext cx="434402" cy="641172"/>
+            <a:ext cx="265805" cy="641172"/>
           </a:xfrm>
           <a:prstGeom prst="bentConnector3">
             <a:avLst/>
@@ -15217,7 +15021,7 @@
                   <a:srgbClr val="7030A0"/>
                 </a:solidFill>
               </a:rPr>
-              <a:t>ReadOnlyAddressBook</a:t>
+              <a:t>ReadOnlySuperbTodo</a:t>
             </a:r>
             <a:endParaRPr lang="en-SG" sz="1050" dirty="0">
               <a:solidFill>
@@ -15400,7 +15204,7 @@
   <p:timing>
     <p:tnLst>
       <p:par>
-        <p:cTn id="1" dur="indefinite" restart="never" nodeType="tmRoot"/>
+        <p:cTn xmlns:p14="http://schemas.microsoft.com/office/powerpoint/2010/main" id="1" dur="indefinite" restart="never" nodeType="tmRoot"/>
       </p:par>
     </p:tnLst>
   </p:timing>
@@ -15557,7 +15361,7 @@
                   <a:schemeClr val="bg1"/>
                 </a:solidFill>
               </a:rPr>
-              <a:t>AddressBookStorage</a:t>
+              <a:t>SuperbTodoStorage</a:t>
             </a:r>
             <a:endParaRPr lang="en-SG" sz="1050" dirty="0">
               <a:solidFill>
@@ -16130,7 +15934,7 @@
                   </a:schemeClr>
                 </a:solidFill>
               </a:rPr>
-              <a:t>XmlAddressBook</a:t>
+              <a:t>XmlSuperbTodo</a:t>
             </a:r>
             <a:r>
               <a:rPr lang="en-US" sz="1050" b="1" dirty="0" smtClean="0">
@@ -16603,7 +16407,7 @@
                   </a:schemeClr>
                 </a:solidFill>
               </a:rPr>
-              <a:t>AddressBook</a:t>
+              <a:t>SuperbTodo</a:t>
             </a:r>
             <a:endParaRPr lang="en-SG" sz="1050" b="1" dirty="0">
               <a:solidFill>
@@ -16749,14 +16553,14 @@
           <a:p>
             <a:pPr algn="ctr"/>
             <a:r>
-              <a:rPr lang="en-US" sz="1050" b="1" dirty="0" err="1" smtClean="0">
+              <a:rPr lang="en-US" sz="1050" b="1" smtClean="0">
                 <a:solidFill>
                   <a:schemeClr val="accent6">
                     <a:lumMod val="75000"/>
                   </a:schemeClr>
                 </a:solidFill>
               </a:rPr>
-              <a:t>XmlAdaptedPerson</a:t>
+              <a:t>XmlAdaptedTask</a:t>
             </a:r>
             <a:endParaRPr lang="en-SG" sz="1050" b="1" dirty="0">
               <a:solidFill>
@@ -16822,7 +16626,7 @@
   <p:timing>
     <p:tnLst>
       <p:par>
-        <p:cTn id="1" dur="indefinite" restart="never" nodeType="tmRoot"/>
+        <p:cTn xmlns:p14="http://schemas.microsoft.com/office/powerpoint/2010/main" id="1" dur="indefinite" restart="never" nodeType="tmRoot"/>
       </p:par>
     </p:tnLst>
   </p:timing>

</xml_diff>